<commit_message>
Modification du document Réponses
</commit_message>
<xml_diff>
--- a/Partie_Heing.pptx
+++ b/Partie_Heing.pptx
@@ -105,6 +105,11 @@
       </a:defRPr>
     </a:lvl9pPr>
   </p:defaultTextStyle>
+  <p:extLst>
+    <p:ext uri="{EFAFB233-063F-42B5-8137-9DF3F51BA10A}">
+      <p15:sldGuideLst xmlns:p15="http://schemas.microsoft.com/office/powerpoint/2012/main"/>
+    </p:ext>
+  </p:extLst>
 </p:presentation>
 </file>
 
@@ -3337,7 +3342,7 @@
         <p:spPr>
           <a:xfrm>
             <a:off x="188686" y="232229"/>
-            <a:ext cx="11045371" cy="6463308"/>
+            <a:ext cx="11045371" cy="6740307"/>
           </a:xfrm>
           <a:prstGeom prst="rect">
             <a:avLst/>
@@ -3527,6 +3532,31 @@
               <a:rPr lang="fr-FR" i="1" dirty="0"/>
               <a:t> </a:t>
             </a:r>
+            <a:r>
+              <a:rPr lang="fr-FR" i="1" dirty="0">
+                <a:sym typeface="Wingdings" panose="05000000000000000000" pitchFamily="2" charset="2"/>
+              </a:rPr>
+              <a:t> Alors, on veut Ud à 0 car c’est une composante inutile pour la mise en rotation du moteur ; ainsi, si on transfert l’E utilisée sur Ud pour </a:t>
+            </a:r>
+            <a:r>
+              <a:rPr lang="fr-FR" i="1" dirty="0" err="1">
+                <a:sym typeface="Wingdings" panose="05000000000000000000" pitchFamily="2" charset="2"/>
+              </a:rPr>
+              <a:t>Uq</a:t>
+            </a:r>
+            <a:r>
+              <a:rPr lang="fr-FR" i="1" dirty="0">
+                <a:sym typeface="Wingdings" panose="05000000000000000000" pitchFamily="2" charset="2"/>
+              </a:rPr>
+              <a:t>, on a un </a:t>
+            </a:r>
+            <a:r>
+              <a:rPr lang="fr-FR" i="1">
+                <a:sym typeface="Wingdings" panose="05000000000000000000" pitchFamily="2" charset="2"/>
+              </a:rPr>
+              <a:t>fonctionnement optimal/maximal.</a:t>
+            </a:r>
+            <a:endParaRPr lang="fr-FR" i="1" dirty="0"/>
           </a:p>
           <a:p>
             <a:pPr marL="285750" indent="-285750">

</xml_diff>